<commit_message>
lesson 1, 2, and 3
</commit_message>
<xml_diff>
--- a/Lesson-2-Our-First-Web-Page/Lesson-2-Our-First-Web-Page.pptx
+++ b/Lesson-2-Our-First-Web-Page/Lesson-2-Our-First-Web-Page.pptx
@@ -11,22 +11,22 @@
     <p:sldId id="256" r:id="rId2"/>
     <p:sldId id="257" r:id="rId3"/>
     <p:sldId id="258" r:id="rId4"/>
-    <p:sldId id="259" r:id="rId5"/>
-    <p:sldId id="269" r:id="rId6"/>
-    <p:sldId id="270" r:id="rId7"/>
-    <p:sldId id="271" r:id="rId8"/>
-    <p:sldId id="272" r:id="rId9"/>
-    <p:sldId id="273" r:id="rId10"/>
-    <p:sldId id="274" r:id="rId11"/>
-    <p:sldId id="275" r:id="rId12"/>
-    <p:sldId id="276" r:id="rId13"/>
-    <p:sldId id="277" r:id="rId14"/>
-    <p:sldId id="278" r:id="rId15"/>
-    <p:sldId id="279" r:id="rId16"/>
-    <p:sldId id="280" r:id="rId17"/>
-    <p:sldId id="281" r:id="rId18"/>
-    <p:sldId id="282" r:id="rId19"/>
-    <p:sldId id="290" r:id="rId20"/>
+    <p:sldId id="290" r:id="rId5"/>
+    <p:sldId id="291" r:id="rId6"/>
+    <p:sldId id="269" r:id="rId7"/>
+    <p:sldId id="270" r:id="rId8"/>
+    <p:sldId id="271" r:id="rId9"/>
+    <p:sldId id="272" r:id="rId10"/>
+    <p:sldId id="273" r:id="rId11"/>
+    <p:sldId id="274" r:id="rId12"/>
+    <p:sldId id="275" r:id="rId13"/>
+    <p:sldId id="276" r:id="rId14"/>
+    <p:sldId id="277" r:id="rId15"/>
+    <p:sldId id="278" r:id="rId16"/>
+    <p:sldId id="279" r:id="rId17"/>
+    <p:sldId id="280" r:id="rId18"/>
+    <p:sldId id="281" r:id="rId19"/>
+    <p:sldId id="282" r:id="rId20"/>
     <p:sldId id="284" r:id="rId21"/>
     <p:sldId id="285" r:id="rId22"/>
     <p:sldId id="287" r:id="rId23"/>
@@ -1789,7 +1789,7 @@
   <p:cSld>
     <p:spTree>
       <p:nvGrpSpPr>
-        <p:cNvPr id="1" name="Shape 136"/>
+        <p:cNvPr id="1" name="Shape 408"/>
         <p:cNvGrpSpPr/>
         <p:nvPr/>
       </p:nvGrpSpPr>
@@ -1803,7 +1803,7 @@
       </p:grpSpPr>
       <p:sp>
         <p:nvSpPr>
-          <p:cNvPr id="137" name="Google Shape;137;ge39aef96eb_0_0:notes"/>
+          <p:cNvPr id="409" name="Google Shape;409;gdf22083ad8_0_156:notes"/>
           <p:cNvSpPr>
             <a:spLocks noGrp="1" noRot="1" noChangeAspect="1"/>
           </p:cNvSpPr>
@@ -1844,7 +1844,7 @@
       </p:sp>
       <p:sp>
         <p:nvSpPr>
-          <p:cNvPr id="138" name="Google Shape;138;ge39aef96eb_0_0:notes"/>
+          <p:cNvPr id="410" name="Google Shape;410;gdf22083ad8_0_156:notes"/>
           <p:cNvSpPr txBox="1">
             <a:spLocks noGrp="1"/>
           </p:cNvSpPr>
@@ -1876,16 +1876,15 @@
               </a:spcAft>
               <a:buNone/>
             </a:pPr>
-            <a:endParaRPr/>
+            <a:r>
+              <a:rPr lang="de-LU" dirty="0"/>
+              <a:t>https://replit.com/@ricproenca/WD0202-Charlie-and-Chloes-Big-Adventure</a:t>
+            </a:r>
+            <a:endParaRPr dirty="0"/>
           </a:p>
         </p:txBody>
       </p:sp>
     </p:spTree>
-    <p:extLst>
-      <p:ext uri="{BB962C8B-B14F-4D97-AF65-F5344CB8AC3E}">
-        <p14:creationId xmlns:p14="http://schemas.microsoft.com/office/powerpoint/2010/main" val="2559017702"/>
-      </p:ext>
-    </p:extLst>
   </p:cSld>
   <p:clrMapOvr>
     <a:masterClrMapping/>
@@ -2023,7 +2022,7 @@
   <p:cSld>
     <p:spTree>
       <p:nvGrpSpPr>
-        <p:cNvPr id="1" name="Shape 408"/>
+        <p:cNvPr id="1" name="Shape 419"/>
         <p:cNvGrpSpPr/>
         <p:nvPr/>
       </p:nvGrpSpPr>
@@ -2037,7 +2036,7 @@
       </p:grpSpPr>
       <p:sp>
         <p:nvSpPr>
-          <p:cNvPr id="409" name="Google Shape;409;gdf22083ad8_0_156:notes"/>
+          <p:cNvPr id="420" name="Google Shape;420;gdf22083ad8_0_190:notes"/>
           <p:cNvSpPr>
             <a:spLocks noGrp="1" noRot="1" noChangeAspect="1"/>
           </p:cNvSpPr>
@@ -2078,7 +2077,7 @@
       </p:sp>
       <p:sp>
         <p:nvSpPr>
-          <p:cNvPr id="410" name="Google Shape;410;gdf22083ad8_0_156:notes"/>
+          <p:cNvPr id="421" name="Google Shape;421;gdf22083ad8_0_190:notes"/>
           <p:cNvSpPr txBox="1">
             <a:spLocks noGrp="1"/>
           </p:cNvSpPr>
@@ -2111,10 +2110,10 @@
               <a:buNone/>
             </a:pPr>
             <a:r>
-              <a:rPr lang="de-LU" dirty="0"/>
-              <a:t>https://replit.com/@ricproenca/WD0202-Charlie-and-Chloes-Big-Adventure</a:t>
+              <a:rPr lang="en-GB"/>
+              <a:t>Anyone with the URL</a:t>
             </a:r>
-            <a:endParaRPr dirty="0"/>
+            <a:endParaRPr/>
           </a:p>
         </p:txBody>
       </p:sp>
@@ -2127,114 +2126,6 @@
 </file>
 
 <file path=ppt/notesSlides/notesSlide21.xml><?xml version="1.0" encoding="utf-8"?>
-<p:notes xmlns:a="http://schemas.openxmlformats.org/drawingml/2006/main" xmlns:r="http://schemas.openxmlformats.org/officeDocument/2006/relationships" xmlns:p="http://schemas.openxmlformats.org/presentationml/2006/main" showMasterSp="0" showMasterPhAnim="0">
-  <p:cSld>
-    <p:spTree>
-      <p:nvGrpSpPr>
-        <p:cNvPr id="1" name="Shape 419"/>
-        <p:cNvGrpSpPr/>
-        <p:nvPr/>
-      </p:nvGrpSpPr>
-      <p:grpSpPr>
-        <a:xfrm>
-          <a:off x="0" y="0"/>
-          <a:ext cx="0" cy="0"/>
-          <a:chOff x="0" y="0"/>
-          <a:chExt cx="0" cy="0"/>
-        </a:xfrm>
-      </p:grpSpPr>
-      <p:sp>
-        <p:nvSpPr>
-          <p:cNvPr id="420" name="Google Shape;420;gdf22083ad8_0_190:notes"/>
-          <p:cNvSpPr>
-            <a:spLocks noGrp="1" noRot="1" noChangeAspect="1"/>
-          </p:cNvSpPr>
-          <p:nvPr>
-            <p:ph type="sldImg" idx="2"/>
-          </p:nvPr>
-        </p:nvSpPr>
-        <p:spPr>
-          <a:xfrm>
-            <a:off x="381000" y="685800"/>
-            <a:ext cx="6096000" cy="3429000"/>
-          </a:xfrm>
-          <a:custGeom>
-            <a:avLst/>
-            <a:gdLst/>
-            <a:ahLst/>
-            <a:cxnLst/>
-            <a:rect l="l" t="t" r="r" b="b"/>
-            <a:pathLst>
-              <a:path w="120000" h="120000" extrusionOk="0">
-                <a:moveTo>
-                  <a:pt x="0" y="0"/>
-                </a:moveTo>
-                <a:lnTo>
-                  <a:pt x="120000" y="0"/>
-                </a:lnTo>
-                <a:lnTo>
-                  <a:pt x="120000" y="120000"/>
-                </a:lnTo>
-                <a:lnTo>
-                  <a:pt x="0" y="120000"/>
-                </a:lnTo>
-                <a:close/>
-              </a:path>
-            </a:pathLst>
-          </a:custGeom>
-        </p:spPr>
-      </p:sp>
-      <p:sp>
-        <p:nvSpPr>
-          <p:cNvPr id="421" name="Google Shape;421;gdf22083ad8_0_190:notes"/>
-          <p:cNvSpPr txBox="1">
-            <a:spLocks noGrp="1"/>
-          </p:cNvSpPr>
-          <p:nvPr>
-            <p:ph type="body" idx="1"/>
-          </p:nvPr>
-        </p:nvSpPr>
-        <p:spPr>
-          <a:xfrm>
-            <a:off x="685800" y="4343400"/>
-            <a:ext cx="5486400" cy="4114800"/>
-          </a:xfrm>
-          <a:prstGeom prst="rect">
-            <a:avLst/>
-          </a:prstGeom>
-        </p:spPr>
-        <p:txBody>
-          <a:bodyPr spcFirstLastPara="1" wrap="square" lIns="91425" tIns="91425" rIns="91425" bIns="91425" anchor="t" anchorCtr="0">
-            <a:noAutofit/>
-          </a:bodyPr>
-          <a:lstStyle/>
-          <a:p>
-            <a:pPr marL="0" lvl="0" indent="0" algn="l" rtl="0">
-              <a:spcBef>
-                <a:spcPts val="0"/>
-              </a:spcBef>
-              <a:spcAft>
-                <a:spcPts val="0"/>
-              </a:spcAft>
-              <a:buNone/>
-            </a:pPr>
-            <a:r>
-              <a:rPr lang="en-GB"/>
-              <a:t>Anyone with the URL</a:t>
-            </a:r>
-            <a:endParaRPr/>
-          </a:p>
-        </p:txBody>
-      </p:sp>
-    </p:spTree>
-  </p:cSld>
-  <p:clrMapOvr>
-    <a:masterClrMapping/>
-  </p:clrMapOvr>
-</p:notes>
-</file>
-
-<file path=ppt/notesSlides/notesSlide22.xml><?xml version="1.0" encoding="utf-8"?>
 <p:notes xmlns:a="http://schemas.openxmlformats.org/drawingml/2006/main" xmlns:r="http://schemas.openxmlformats.org/officeDocument/2006/relationships" xmlns:p="http://schemas.openxmlformats.org/presentationml/2006/main" showMasterSp="0" showMasterPhAnim="0">
   <p:cSld>
     <p:spTree>
@@ -2338,7 +2229,7 @@
 </p:notes>
 </file>
 
-<file path=ppt/notesSlides/notesSlide23.xml><?xml version="1.0" encoding="utf-8"?>
+<file path=ppt/notesSlides/notesSlide22.xml><?xml version="1.0" encoding="utf-8"?>
 <p:notes xmlns:a="http://schemas.openxmlformats.org/drawingml/2006/main" xmlns:r="http://schemas.openxmlformats.org/officeDocument/2006/relationships" xmlns:p="http://schemas.openxmlformats.org/presentationml/2006/main" showMasterSp="0" showMasterPhAnim="0">
   <p:cSld>
     <p:spTree>
@@ -2442,7 +2333,7 @@
 </p:notes>
 </file>
 
-<file path=ppt/notesSlides/notesSlide24.xml><?xml version="1.0" encoding="utf-8"?>
+<file path=ppt/notesSlides/notesSlide23.xml><?xml version="1.0" encoding="utf-8"?>
 <p:notes xmlns:a="http://schemas.openxmlformats.org/drawingml/2006/main" xmlns:r="http://schemas.openxmlformats.org/officeDocument/2006/relationships" xmlns:p="http://schemas.openxmlformats.org/presentationml/2006/main" showMasterSp="0" showMasterPhAnim="0">
   <p:cSld>
     <p:spTree>
@@ -2747,6 +2638,11 @@
         </p:txBody>
       </p:sp>
     </p:spTree>
+    <p:extLst>
+      <p:ext uri="{BB962C8B-B14F-4D97-AF65-F5344CB8AC3E}">
+        <p14:creationId xmlns:p14="http://schemas.microsoft.com/office/powerpoint/2010/main" val="1763189463"/>
+      </p:ext>
+    </p:extLst>
   </p:cSld>
   <p:clrMapOvr>
     <a:masterClrMapping/>
@@ -8624,6 +8520,476 @@
   <p:cSld>
     <p:spTree>
       <p:nvGrpSpPr>
+        <p:cNvPr id="1" name="Shape 289"/>
+        <p:cNvGrpSpPr/>
+        <p:nvPr/>
+      </p:nvGrpSpPr>
+      <p:grpSpPr>
+        <a:xfrm>
+          <a:off x="0" y="0"/>
+          <a:ext cx="0" cy="0"/>
+          <a:chOff x="0" y="0"/>
+          <a:chExt cx="0" cy="0"/>
+        </a:xfrm>
+      </p:grpSpPr>
+      <p:sp>
+        <p:nvSpPr>
+          <p:cNvPr id="290" name="Google Shape;290;p42"/>
+          <p:cNvSpPr txBox="1">
+            <a:spLocks noGrp="1"/>
+          </p:cNvSpPr>
+          <p:nvPr>
+            <p:ph type="title"/>
+          </p:nvPr>
+        </p:nvSpPr>
+        <p:spPr>
+          <a:xfrm>
+            <a:off x="311700" y="445025"/>
+            <a:ext cx="8520600" cy="572700"/>
+          </a:xfrm>
+          <a:prstGeom prst="rect">
+            <a:avLst/>
+          </a:prstGeom>
+        </p:spPr>
+        <p:txBody>
+          <a:bodyPr spcFirstLastPara="1" wrap="square" lIns="91425" tIns="91425" rIns="91425" bIns="91425" anchor="t" anchorCtr="0">
+            <a:noAutofit/>
+          </a:bodyPr>
+          <a:lstStyle/>
+          <a:p>
+            <a:pPr marL="0" lvl="0" indent="0" algn="l" rtl="0">
+              <a:spcBef>
+                <a:spcPts val="0"/>
+              </a:spcBef>
+              <a:spcAft>
+                <a:spcPts val="0"/>
+              </a:spcAft>
+              <a:buNone/>
+            </a:pPr>
+            <a:r>
+              <a:rPr lang="en-GB"/>
+              <a:t>Basic HTML Structure - Head tag</a:t>
+            </a:r>
+            <a:endParaRPr/>
+          </a:p>
+        </p:txBody>
+      </p:sp>
+      <p:sp>
+        <p:nvSpPr>
+          <p:cNvPr id="292" name="Google Shape;292;p42"/>
+          <p:cNvSpPr txBox="1"/>
+          <p:nvPr/>
+        </p:nvSpPr>
+        <p:spPr>
+          <a:xfrm>
+            <a:off x="8320058" y="4663217"/>
+            <a:ext cx="548700" cy="393600"/>
+          </a:xfrm>
+          <a:prstGeom prst="rect">
+            <a:avLst/>
+          </a:prstGeom>
+          <a:noFill/>
+          <a:ln>
+            <a:noFill/>
+          </a:ln>
+        </p:spPr>
+        <p:txBody>
+          <a:bodyPr spcFirstLastPara="1" wrap="square" lIns="91425" tIns="91425" rIns="91425" bIns="91425" anchor="ctr" anchorCtr="0">
+            <a:noAutofit/>
+          </a:bodyPr>
+          <a:lstStyle/>
+          <a:p>
+            <a:pPr marL="0" lvl="0" indent="0" algn="r" rtl="0">
+              <a:spcBef>
+                <a:spcPts val="0"/>
+              </a:spcBef>
+              <a:spcAft>
+                <a:spcPts val="0"/>
+              </a:spcAft>
+              <a:buNone/>
+            </a:pPr>
+            <a:fld id="{00000000-1234-1234-1234-123412341234}" type="slidenum">
+              <a:rPr lang="en-GB" sz="1000" b="1">
+                <a:solidFill>
+                  <a:srgbClr val="032F62"/>
+                </a:solidFill>
+                <a:latin typeface="Francois One"/>
+                <a:ea typeface="Francois One"/>
+                <a:cs typeface="Francois One"/>
+                <a:sym typeface="Francois One"/>
+              </a:rPr>
+              <a:t>10</a:t>
+            </a:fld>
+            <a:endParaRPr sz="1000" b="1">
+              <a:solidFill>
+                <a:srgbClr val="032F62"/>
+              </a:solidFill>
+              <a:latin typeface="Francois One"/>
+              <a:ea typeface="Francois One"/>
+              <a:cs typeface="Francois One"/>
+              <a:sym typeface="Francois One"/>
+            </a:endParaRPr>
+          </a:p>
+        </p:txBody>
+      </p:sp>
+      <p:sp>
+        <p:nvSpPr>
+          <p:cNvPr id="294" name="Google Shape;294;p42"/>
+          <p:cNvSpPr txBox="1"/>
+          <p:nvPr/>
+        </p:nvSpPr>
+        <p:spPr>
+          <a:xfrm>
+            <a:off x="5109000" y="1347800"/>
+            <a:ext cx="3723300" cy="2055000"/>
+          </a:xfrm>
+          <a:prstGeom prst="rect">
+            <a:avLst/>
+          </a:prstGeom>
+          <a:noFill/>
+          <a:ln>
+            <a:noFill/>
+          </a:ln>
+        </p:spPr>
+        <p:txBody>
+          <a:bodyPr spcFirstLastPara="1" wrap="square" lIns="91425" tIns="91425" rIns="91425" bIns="91425" anchor="t" anchorCtr="0">
+            <a:spAutoFit/>
+          </a:bodyPr>
+          <a:lstStyle/>
+          <a:p>
+            <a:pPr marL="0" lvl="0" indent="0" algn="l" rtl="0">
+              <a:lnSpc>
+                <a:spcPct val="115000"/>
+              </a:lnSpc>
+              <a:spcBef>
+                <a:spcPts val="0"/>
+              </a:spcBef>
+              <a:spcAft>
+                <a:spcPts val="0"/>
+              </a:spcAft>
+              <a:buNone/>
+            </a:pPr>
+            <a:r>
+              <a:rPr lang="en-GB" sz="1800">
+                <a:solidFill>
+                  <a:srgbClr val="595959"/>
+                </a:solidFill>
+                <a:latin typeface="Roboto"/>
+                <a:ea typeface="Roboto"/>
+                <a:cs typeface="Roboto"/>
+                <a:sym typeface="Roboto"/>
+              </a:rPr>
+              <a:t>Similarly, the </a:t>
+            </a:r>
+            <a:r>
+              <a:rPr lang="en-GB" sz="1800">
+                <a:solidFill>
+                  <a:srgbClr val="980000"/>
+                </a:solidFill>
+                <a:latin typeface="Roboto Mono"/>
+                <a:ea typeface="Roboto Mono"/>
+                <a:cs typeface="Roboto Mono"/>
+                <a:sym typeface="Roboto Mono"/>
+              </a:rPr>
+              <a:t>&lt;head&gt;</a:t>
+            </a:r>
+            <a:r>
+              <a:rPr lang="en-GB" sz="1800">
+                <a:solidFill>
+                  <a:srgbClr val="595959"/>
+                </a:solidFill>
+                <a:latin typeface="Roboto"/>
+                <a:ea typeface="Roboto"/>
+                <a:cs typeface="Roboto"/>
+                <a:sym typeface="Roboto"/>
+              </a:rPr>
+              <a:t> element is a container for metadata. </a:t>
+            </a:r>
+            <a:endParaRPr sz="1800">
+              <a:solidFill>
+                <a:srgbClr val="595959"/>
+              </a:solidFill>
+              <a:latin typeface="Roboto"/>
+              <a:ea typeface="Roboto"/>
+              <a:cs typeface="Roboto"/>
+              <a:sym typeface="Roboto"/>
+            </a:endParaRPr>
+          </a:p>
+          <a:p>
+            <a:pPr marL="0" lvl="0" indent="0" algn="l" rtl="0">
+              <a:lnSpc>
+                <a:spcPct val="115000"/>
+              </a:lnSpc>
+              <a:spcBef>
+                <a:spcPts val="0"/>
+              </a:spcBef>
+              <a:spcAft>
+                <a:spcPts val="0"/>
+              </a:spcAft>
+              <a:buNone/>
+            </a:pPr>
+            <a:endParaRPr sz="1800">
+              <a:solidFill>
+                <a:srgbClr val="595959"/>
+              </a:solidFill>
+              <a:latin typeface="Roboto"/>
+              <a:ea typeface="Roboto"/>
+              <a:cs typeface="Roboto"/>
+              <a:sym typeface="Roboto"/>
+            </a:endParaRPr>
+          </a:p>
+          <a:p>
+            <a:pPr marL="0" lvl="0" indent="0" algn="l" rtl="0">
+              <a:lnSpc>
+                <a:spcPct val="115000"/>
+              </a:lnSpc>
+              <a:spcBef>
+                <a:spcPts val="0"/>
+              </a:spcBef>
+              <a:spcAft>
+                <a:spcPts val="0"/>
+              </a:spcAft>
+              <a:buNone/>
+            </a:pPr>
+            <a:r>
+              <a:rPr lang="en-GB" sz="1800">
+                <a:solidFill>
+                  <a:srgbClr val="595959"/>
+                </a:solidFill>
+                <a:latin typeface="Roboto"/>
+                <a:ea typeface="Roboto"/>
+                <a:cs typeface="Roboto"/>
+                <a:sym typeface="Roboto"/>
+              </a:rPr>
+              <a:t>Here we use it to set the title of the webpage, which gets displayed in the tab of your browser.</a:t>
+            </a:r>
+            <a:endParaRPr sz="1800">
+              <a:solidFill>
+                <a:srgbClr val="595959"/>
+              </a:solidFill>
+              <a:latin typeface="Roboto"/>
+              <a:ea typeface="Roboto"/>
+              <a:cs typeface="Roboto"/>
+              <a:sym typeface="Roboto"/>
+            </a:endParaRPr>
+          </a:p>
+        </p:txBody>
+      </p:sp>
+      <p:pic>
+        <p:nvPicPr>
+          <p:cNvPr id="295" name="Google Shape;295;p42"/>
+          <p:cNvPicPr preferRelativeResize="0"/>
+          <p:nvPr/>
+        </p:nvPicPr>
+        <p:blipFill>
+          <a:blip r:embed="rId3">
+            <a:alphaModFix/>
+          </a:blip>
+          <a:stretch>
+            <a:fillRect/>
+          </a:stretch>
+        </p:blipFill>
+        <p:spPr>
+          <a:xfrm>
+            <a:off x="311700" y="1347788"/>
+            <a:ext cx="4619625" cy="2447925"/>
+          </a:xfrm>
+          <a:prstGeom prst="rect">
+            <a:avLst/>
+          </a:prstGeom>
+          <a:noFill/>
+          <a:ln w="9525" cap="flat" cmpd="sng">
+            <a:solidFill>
+              <a:schemeClr val="dk2"/>
+            </a:solidFill>
+            <a:prstDash val="solid"/>
+            <a:round/>
+            <a:headEnd type="none" w="sm" len="sm"/>
+            <a:tailEnd type="none" w="sm" len="sm"/>
+          </a:ln>
+        </p:spPr>
+      </p:pic>
+      <p:sp>
+        <p:nvSpPr>
+          <p:cNvPr id="296" name="Google Shape;296;p42"/>
+          <p:cNvSpPr/>
+          <p:nvPr/>
+        </p:nvSpPr>
+        <p:spPr>
+          <a:xfrm>
+            <a:off x="1076400" y="1928600"/>
+            <a:ext cx="697500" cy="209100"/>
+          </a:xfrm>
+          <a:prstGeom prst="rect">
+            <a:avLst/>
+          </a:prstGeom>
+          <a:noFill/>
+          <a:ln w="28575" cap="flat" cmpd="sng">
+            <a:solidFill>
+              <a:srgbClr val="FF0000"/>
+            </a:solidFill>
+            <a:prstDash val="solid"/>
+            <a:round/>
+            <a:headEnd type="none" w="sm" len="sm"/>
+            <a:tailEnd type="none" w="sm" len="sm"/>
+          </a:ln>
+        </p:spPr>
+        <p:txBody>
+          <a:bodyPr spcFirstLastPara="1" wrap="square" lIns="91425" tIns="91425" rIns="91425" bIns="91425" anchor="ctr" anchorCtr="0">
+            <a:noAutofit/>
+          </a:bodyPr>
+          <a:lstStyle/>
+          <a:p>
+            <a:pPr marL="0" lvl="0" indent="0" algn="l" rtl="0">
+              <a:spcBef>
+                <a:spcPts val="0"/>
+              </a:spcBef>
+              <a:spcAft>
+                <a:spcPts val="0"/>
+              </a:spcAft>
+              <a:buNone/>
+            </a:pPr>
+            <a:endParaRPr/>
+          </a:p>
+        </p:txBody>
+      </p:sp>
+      <p:sp>
+        <p:nvSpPr>
+          <p:cNvPr id="297" name="Google Shape;297;p42"/>
+          <p:cNvSpPr/>
+          <p:nvPr/>
+        </p:nvSpPr>
+        <p:spPr>
+          <a:xfrm>
+            <a:off x="1076400" y="2467213"/>
+            <a:ext cx="805800" cy="209100"/>
+          </a:xfrm>
+          <a:prstGeom prst="rect">
+            <a:avLst/>
+          </a:prstGeom>
+          <a:noFill/>
+          <a:ln w="28575" cap="flat" cmpd="sng">
+            <a:solidFill>
+              <a:srgbClr val="FF0000"/>
+            </a:solidFill>
+            <a:prstDash val="solid"/>
+            <a:round/>
+            <a:headEnd type="none" w="sm" len="sm"/>
+            <a:tailEnd type="none" w="sm" len="sm"/>
+          </a:ln>
+        </p:spPr>
+        <p:txBody>
+          <a:bodyPr spcFirstLastPara="1" wrap="square" lIns="91425" tIns="91425" rIns="91425" bIns="91425" anchor="ctr" anchorCtr="0">
+            <a:noAutofit/>
+          </a:bodyPr>
+          <a:lstStyle/>
+          <a:p>
+            <a:pPr marL="0" lvl="0" indent="0" algn="l" rtl="0">
+              <a:spcBef>
+                <a:spcPts val="0"/>
+              </a:spcBef>
+              <a:spcAft>
+                <a:spcPts val="0"/>
+              </a:spcAft>
+              <a:buNone/>
+            </a:pPr>
+            <a:endParaRPr/>
+          </a:p>
+        </p:txBody>
+      </p:sp>
+      <p:pic>
+        <p:nvPicPr>
+          <p:cNvPr id="298" name="Google Shape;298;p42"/>
+          <p:cNvPicPr preferRelativeResize="0"/>
+          <p:nvPr/>
+        </p:nvPicPr>
+        <p:blipFill>
+          <a:blip r:embed="rId4">
+            <a:alphaModFix/>
+          </a:blip>
+          <a:stretch>
+            <a:fillRect/>
+          </a:stretch>
+        </p:blipFill>
+        <p:spPr>
+          <a:xfrm>
+            <a:off x="538236" y="4287600"/>
+            <a:ext cx="677100" cy="677100"/>
+          </a:xfrm>
+          <a:prstGeom prst="rect">
+            <a:avLst/>
+          </a:prstGeom>
+          <a:noFill/>
+          <a:ln>
+            <a:noFill/>
+          </a:ln>
+        </p:spPr>
+      </p:pic>
+      <p:sp>
+        <p:nvSpPr>
+          <p:cNvPr id="299" name="Google Shape;299;p42"/>
+          <p:cNvSpPr txBox="1"/>
+          <p:nvPr/>
+        </p:nvSpPr>
+        <p:spPr>
+          <a:xfrm>
+            <a:off x="1215325" y="4318350"/>
+            <a:ext cx="5457300" cy="615600"/>
+          </a:xfrm>
+          <a:prstGeom prst="rect">
+            <a:avLst/>
+          </a:prstGeom>
+          <a:noFill/>
+          <a:ln>
+            <a:noFill/>
+          </a:ln>
+        </p:spPr>
+        <p:txBody>
+          <a:bodyPr spcFirstLastPara="1" wrap="square" lIns="91425" tIns="91425" rIns="91425" bIns="91425" anchor="t" anchorCtr="0">
+            <a:spAutoFit/>
+          </a:bodyPr>
+          <a:lstStyle/>
+          <a:p>
+            <a:pPr marL="0" lvl="0" indent="0" algn="l" rtl="0">
+              <a:spcBef>
+                <a:spcPts val="0"/>
+              </a:spcBef>
+              <a:spcAft>
+                <a:spcPts val="0"/>
+              </a:spcAft>
+              <a:buNone/>
+            </a:pPr>
+            <a:r>
+              <a:rPr lang="en-GB">
+                <a:latin typeface="Roboto"/>
+                <a:ea typeface="Roboto"/>
+                <a:cs typeface="Roboto"/>
+                <a:sym typeface="Roboto"/>
+              </a:rPr>
+              <a:t>Metadata is data about other data. For example, if we call a song our data, the metadata would be the author and song title.</a:t>
+            </a:r>
+            <a:endParaRPr>
+              <a:latin typeface="Roboto"/>
+              <a:ea typeface="Roboto"/>
+              <a:cs typeface="Roboto"/>
+              <a:sym typeface="Roboto"/>
+            </a:endParaRPr>
+          </a:p>
+        </p:txBody>
+      </p:sp>
+    </p:spTree>
+  </p:cSld>
+  <p:clrMapOvr>
+    <a:masterClrMapping/>
+  </p:clrMapOvr>
+</p:sld>
+</file>
+
+<file path=ppt/slides/slide11.xml><?xml version="1.0" encoding="utf-8"?>
+<p:sld xmlns:a="http://schemas.openxmlformats.org/drawingml/2006/main" xmlns:r="http://schemas.openxmlformats.org/officeDocument/2006/relationships" xmlns:p="http://schemas.openxmlformats.org/presentationml/2006/main">
+  <p:cSld>
+    <p:spTree>
+      <p:nvGrpSpPr>
         <p:cNvPr id="1" name="Shape 303"/>
         <p:cNvGrpSpPr/>
         <p:nvPr/>
@@ -8722,7 +9088,7 @@
                 <a:cs typeface="Francois One"/>
                 <a:sym typeface="Francois One"/>
               </a:rPr>
-              <a:t>10</a:t>
+              <a:t>11</a:t>
             </a:fld>
             <a:endParaRPr sz="1000" b="1">
               <a:solidFill>
@@ -8989,7 +9355,7 @@
 </p:sld>
 </file>
 
-<file path=ppt/slides/slide11.xml><?xml version="1.0" encoding="utf-8"?>
+<file path=ppt/slides/slide12.xml><?xml version="1.0" encoding="utf-8"?>
 <p:sld xmlns:a="http://schemas.openxmlformats.org/drawingml/2006/main" xmlns:r="http://schemas.openxmlformats.org/officeDocument/2006/relationships" xmlns:p="http://schemas.openxmlformats.org/presentationml/2006/main">
   <p:cSld>
     <p:spTree>
@@ -9312,7 +9678,7 @@
                 <a:cs typeface="Francois One"/>
                 <a:sym typeface="Francois One"/>
               </a:rPr>
-              <a:t>11</a:t>
+              <a:t>12</a:t>
             </a:fld>
             <a:endParaRPr sz="1000" b="1">
               <a:solidFill>
@@ -9334,7 +9700,7 @@
 </p:sld>
 </file>
 
-<file path=ppt/slides/slide12.xml><?xml version="1.0" encoding="utf-8"?>
+<file path=ppt/slides/slide13.xml><?xml version="1.0" encoding="utf-8"?>
 <p:sld xmlns:a="http://schemas.openxmlformats.org/drawingml/2006/main" xmlns:r="http://schemas.openxmlformats.org/officeDocument/2006/relationships" xmlns:p="http://schemas.openxmlformats.org/presentationml/2006/main">
   <p:cSld>
     <p:spTree>
@@ -9437,7 +9803,7 @@
                 <a:cs typeface="Francois One"/>
                 <a:sym typeface="Francois One"/>
               </a:rPr>
-              <a:t>12</a:t>
+              <a:t>13</a:t>
             </a:fld>
             <a:endParaRPr sz="1000" b="1">
               <a:solidFill>
@@ -9678,7 +10044,7 @@
 </p:sld>
 </file>
 
-<file path=ppt/slides/slide13.xml><?xml version="1.0" encoding="utf-8"?>
+<file path=ppt/slides/slide14.xml><?xml version="1.0" encoding="utf-8"?>
 <p:sld xmlns:a="http://schemas.openxmlformats.org/drawingml/2006/main" xmlns:r="http://schemas.openxmlformats.org/officeDocument/2006/relationships" xmlns:p="http://schemas.openxmlformats.org/presentationml/2006/main">
   <p:cSld>
     <p:spTree>
@@ -9781,7 +10147,7 @@
                 <a:cs typeface="Francois One"/>
                 <a:sym typeface="Francois One"/>
               </a:rPr>
-              <a:t>13</a:t>
+              <a:t>14</a:t>
             </a:fld>
             <a:endParaRPr sz="1000" b="1">
               <a:solidFill>
@@ -10104,7 +10470,7 @@
 </p:sld>
 </file>
 
-<file path=ppt/slides/slide14.xml><?xml version="1.0" encoding="utf-8"?>
+<file path=ppt/slides/slide15.xml><?xml version="1.0" encoding="utf-8"?>
 <p:sld xmlns:a="http://schemas.openxmlformats.org/drawingml/2006/main" xmlns:r="http://schemas.openxmlformats.org/officeDocument/2006/relationships" xmlns:p="http://schemas.openxmlformats.org/presentationml/2006/main">
   <p:cSld>
     <p:spTree>
@@ -10207,7 +10573,7 @@
                 <a:cs typeface="Francois One"/>
                 <a:sym typeface="Francois One"/>
               </a:rPr>
-              <a:t>14</a:t>
+              <a:t>15</a:t>
             </a:fld>
             <a:endParaRPr sz="1000" b="1">
               <a:solidFill>
@@ -10443,7 +10809,7 @@
 </p:sld>
 </file>
 
-<file path=ppt/slides/slide15.xml><?xml version="1.0" encoding="utf-8"?>
+<file path=ppt/slides/slide16.xml><?xml version="1.0" encoding="utf-8"?>
 <p:sld xmlns:a="http://schemas.openxmlformats.org/drawingml/2006/main" xmlns:r="http://schemas.openxmlformats.org/officeDocument/2006/relationships" xmlns:p="http://schemas.openxmlformats.org/presentationml/2006/main">
   <p:cSld>
     <p:spTree>
@@ -10546,7 +10912,7 @@
                 <a:cs typeface="Francois One"/>
                 <a:sym typeface="Francois One"/>
               </a:rPr>
-              <a:t>15</a:t>
+              <a:t>16</a:t>
             </a:fld>
             <a:endParaRPr sz="1000" b="1">
               <a:solidFill>
@@ -10753,7 +11119,7 @@
 </p:sld>
 </file>
 
-<file path=ppt/slides/slide16.xml><?xml version="1.0" encoding="utf-8"?>
+<file path=ppt/slides/slide17.xml><?xml version="1.0" encoding="utf-8"?>
 <p:sld xmlns:a="http://schemas.openxmlformats.org/drawingml/2006/main" xmlns:r="http://schemas.openxmlformats.org/officeDocument/2006/relationships" xmlns:p="http://schemas.openxmlformats.org/presentationml/2006/main">
   <p:cSld>
     <p:spTree>
@@ -10873,7 +11239,7 @@
                 <a:cs typeface="Francois One"/>
                 <a:sym typeface="Francois One"/>
               </a:rPr>
-              <a:t>16</a:t>
+              <a:t>17</a:t>
             </a:fld>
             <a:endParaRPr sz="1000" b="1">
               <a:solidFill>
@@ -11067,7 +11433,7 @@
 </p:sld>
 </file>
 
-<file path=ppt/slides/slide17.xml><?xml version="1.0" encoding="utf-8"?>
+<file path=ppt/slides/slide18.xml><?xml version="1.0" encoding="utf-8"?>
 <p:sld xmlns:a="http://schemas.openxmlformats.org/drawingml/2006/main" xmlns:r="http://schemas.openxmlformats.org/officeDocument/2006/relationships" xmlns:p="http://schemas.openxmlformats.org/presentationml/2006/main">
   <p:cSld>
     <p:spTree>
@@ -11187,7 +11553,7 @@
                 <a:cs typeface="Francois One"/>
                 <a:sym typeface="Francois One"/>
               </a:rPr>
-              <a:t>17</a:t>
+              <a:t>18</a:t>
             </a:fld>
             <a:endParaRPr sz="1000" b="1">
               <a:solidFill>
@@ -11458,7 +11824,7 @@
 </p:sld>
 </file>
 
-<file path=ppt/slides/slide18.xml><?xml version="1.0" encoding="utf-8"?>
+<file path=ppt/slides/slide19.xml><?xml version="1.0" encoding="utf-8"?>
 <p:sld xmlns:a="http://schemas.openxmlformats.org/drawingml/2006/main" xmlns:r="http://schemas.openxmlformats.org/officeDocument/2006/relationships" xmlns:p="http://schemas.openxmlformats.org/presentationml/2006/main">
   <p:cSld>
     <p:spTree>
@@ -11561,7 +11927,7 @@
                 <a:cs typeface="Francois One"/>
                 <a:sym typeface="Francois One"/>
               </a:rPr>
-              <a:t>18</a:t>
+              <a:t>19</a:t>
             </a:fld>
             <a:endParaRPr sz="1000" b="1">
               <a:solidFill>
@@ -11734,282 +12100,6 @@
         </p:spPr>
       </p:pic>
     </p:spTree>
-  </p:cSld>
-  <p:clrMapOvr>
-    <a:masterClrMapping/>
-  </p:clrMapOvr>
-</p:sld>
-</file>
-
-<file path=ppt/slides/slide19.xml><?xml version="1.0" encoding="utf-8"?>
-<p:sld xmlns:a="http://schemas.openxmlformats.org/drawingml/2006/main" xmlns:r="http://schemas.openxmlformats.org/officeDocument/2006/relationships" xmlns:p="http://schemas.openxmlformats.org/presentationml/2006/main">
-  <p:cSld>
-    <p:spTree>
-      <p:nvGrpSpPr>
-        <p:cNvPr id="1" name="Shape 139"/>
-        <p:cNvGrpSpPr/>
-        <p:nvPr/>
-      </p:nvGrpSpPr>
-      <p:grpSpPr>
-        <a:xfrm>
-          <a:off x="0" y="0"/>
-          <a:ext cx="0" cy="0"/>
-          <a:chOff x="0" y="0"/>
-          <a:chExt cx="0" cy="0"/>
-        </a:xfrm>
-      </p:grpSpPr>
-      <p:sp>
-        <p:nvSpPr>
-          <p:cNvPr id="141" name="Google Shape;141;p28"/>
-          <p:cNvSpPr/>
-          <p:nvPr/>
-        </p:nvSpPr>
-        <p:spPr>
-          <a:xfrm>
-            <a:off x="-6215" y="0"/>
-            <a:ext cx="9162000" cy="74400"/>
-          </a:xfrm>
-          <a:prstGeom prst="rect">
-            <a:avLst/>
-          </a:prstGeom>
-          <a:solidFill>
-            <a:srgbClr val="30DDAE"/>
-          </a:solidFill>
-          <a:ln>
-            <a:noFill/>
-          </a:ln>
-        </p:spPr>
-        <p:txBody>
-          <a:bodyPr spcFirstLastPara="1" wrap="square" lIns="91425" tIns="91425" rIns="91425" bIns="91425" anchor="ctr" anchorCtr="0">
-            <a:noAutofit/>
-          </a:bodyPr>
-          <a:lstStyle/>
-          <a:p>
-            <a:pPr marL="0" lvl="0" indent="0" algn="l" rtl="0">
-              <a:spcBef>
-                <a:spcPts val="0"/>
-              </a:spcBef>
-              <a:spcAft>
-                <a:spcPts val="0"/>
-              </a:spcAft>
-              <a:buNone/>
-            </a:pPr>
-            <a:endParaRPr>
-              <a:solidFill>
-                <a:srgbClr val="30DDAE"/>
-              </a:solidFill>
-            </a:endParaRPr>
-          </a:p>
-        </p:txBody>
-      </p:sp>
-      <p:pic>
-        <p:nvPicPr>
-          <p:cNvPr id="2" name="Picture 1">
-            <a:extLst>
-              <a:ext uri="{FF2B5EF4-FFF2-40B4-BE49-F238E27FC236}">
-                <a16:creationId xmlns:a16="http://schemas.microsoft.com/office/drawing/2014/main" id="{9DB6F117-09F9-0125-802B-D690BFA7F01A}"/>
-              </a:ext>
-            </a:extLst>
-          </p:cNvPr>
-          <p:cNvPicPr>
-            <a:picLocks noChangeAspect="1"/>
-          </p:cNvPicPr>
-          <p:nvPr/>
-        </p:nvPicPr>
-        <p:blipFill>
-          <a:blip r:embed="rId3"/>
-          <a:stretch>
-            <a:fillRect/>
-          </a:stretch>
-        </p:blipFill>
-        <p:spPr>
-          <a:xfrm>
-            <a:off x="67613" y="160386"/>
-            <a:ext cx="8906012" cy="4250382"/>
-          </a:xfrm>
-          <a:prstGeom prst="rect">
-            <a:avLst/>
-          </a:prstGeom>
-        </p:spPr>
-      </p:pic>
-      <p:sp>
-        <p:nvSpPr>
-          <p:cNvPr id="142" name="Google Shape;142;p28"/>
-          <p:cNvSpPr txBox="1">
-            <a:spLocks noGrp="1"/>
-          </p:cNvSpPr>
-          <p:nvPr>
-            <p:ph type="title"/>
-          </p:nvPr>
-        </p:nvSpPr>
-        <p:spPr>
-          <a:xfrm>
-            <a:off x="1614034" y="3611536"/>
-            <a:ext cx="6057600" cy="572700"/>
-          </a:xfrm>
-          <a:prstGeom prst="rect">
-            <a:avLst/>
-          </a:prstGeom>
-          <a:solidFill>
-            <a:srgbClr val="FBF39B"/>
-          </a:solidFill>
-          <a:ln w="19050" cap="flat" cmpd="sng">
-            <a:solidFill>
-              <a:srgbClr val="25326F"/>
-            </a:solidFill>
-            <a:prstDash val="solid"/>
-            <a:round/>
-            <a:headEnd type="none" w="sm" len="sm"/>
-            <a:tailEnd type="none" w="sm" len="sm"/>
-          </a:ln>
-        </p:spPr>
-        <p:txBody>
-          <a:bodyPr spcFirstLastPara="1" wrap="square" lIns="91425" tIns="91425" rIns="91425" bIns="91425" anchor="t" anchorCtr="0">
-            <a:noAutofit/>
-          </a:bodyPr>
-          <a:lstStyle/>
-          <a:p>
-            <a:pPr marL="0" lvl="0" indent="0" algn="ctr" rtl="0">
-              <a:spcBef>
-                <a:spcPts val="0"/>
-              </a:spcBef>
-              <a:spcAft>
-                <a:spcPts val="0"/>
-              </a:spcAft>
-              <a:buClr>
-                <a:schemeClr val="dk1"/>
-              </a:buClr>
-              <a:buSzPts val="1100"/>
-              <a:buFont typeface="Arial"/>
-              <a:buNone/>
-            </a:pPr>
-            <a:r>
-              <a:rPr lang="en-GB" sz="2400" dirty="0"/>
-              <a:t>Join </a:t>
-            </a:r>
-            <a:r>
-              <a:rPr lang="en-GB" sz="2400" dirty="0" err="1"/>
-              <a:t>Replit</a:t>
-            </a:r>
-            <a:r>
-              <a:rPr lang="en-GB" sz="2400" dirty="0"/>
-              <a:t> at </a:t>
-            </a:r>
-            <a:r>
-              <a:rPr lang="en-GB" sz="2000" b="1" u="sng" dirty="0">
-                <a:solidFill>
-                  <a:schemeClr val="hlink"/>
-                </a:solidFill>
-                <a:latin typeface="Roboto Mono"/>
-                <a:ea typeface="Roboto Mono"/>
-                <a:cs typeface="Roboto Mono"/>
-                <a:sym typeface="Roboto Mono"/>
-              </a:rPr>
-              <a:t>https://</a:t>
-            </a:r>
-            <a:r>
-              <a:rPr lang="en-GB" sz="2000" b="1" u="sng" dirty="0" err="1">
-                <a:solidFill>
-                  <a:schemeClr val="hlink"/>
-                </a:solidFill>
-                <a:latin typeface="Roboto Mono"/>
-                <a:ea typeface="Roboto Mono"/>
-                <a:cs typeface="Roboto Mono"/>
-                <a:sym typeface="Roboto Mono"/>
-              </a:rPr>
-              <a:t>replit.com</a:t>
-            </a:r>
-            <a:r>
-              <a:rPr lang="en-GB" sz="2000" b="1" u="sng" dirty="0">
-                <a:solidFill>
-                  <a:schemeClr val="hlink"/>
-                </a:solidFill>
-                <a:latin typeface="Roboto Mono"/>
-                <a:ea typeface="Roboto Mono"/>
-                <a:cs typeface="Roboto Mono"/>
-                <a:sym typeface="Roboto Mono"/>
-              </a:rPr>
-              <a:t>/</a:t>
-            </a:r>
-            <a:endParaRPr sz="2000" b="1" dirty="0">
-              <a:latin typeface="Roboto Mono"/>
-              <a:ea typeface="Roboto Mono"/>
-              <a:cs typeface="Roboto Mono"/>
-              <a:sym typeface="Roboto Mono"/>
-            </a:endParaRPr>
-          </a:p>
-        </p:txBody>
-      </p:sp>
-      <p:sp>
-        <p:nvSpPr>
-          <p:cNvPr id="3" name="Google Shape;134;p27">
-            <a:extLst>
-              <a:ext uri="{FF2B5EF4-FFF2-40B4-BE49-F238E27FC236}">
-                <a16:creationId xmlns:a16="http://schemas.microsoft.com/office/drawing/2014/main" id="{A6A0E5F6-FD6F-9091-56EB-E3BB7EA56E9D}"/>
-              </a:ext>
-            </a:extLst>
-          </p:cNvPr>
-          <p:cNvSpPr txBox="1"/>
-          <p:nvPr/>
-        </p:nvSpPr>
-        <p:spPr>
-          <a:xfrm>
-            <a:off x="8320058" y="4663217"/>
-            <a:ext cx="548700" cy="393600"/>
-          </a:xfrm>
-          <a:prstGeom prst="rect">
-            <a:avLst/>
-          </a:prstGeom>
-          <a:noFill/>
-          <a:ln>
-            <a:noFill/>
-          </a:ln>
-        </p:spPr>
-        <p:txBody>
-          <a:bodyPr spcFirstLastPara="1" wrap="square" lIns="91425" tIns="91425" rIns="91425" bIns="91425" anchor="ctr" anchorCtr="0">
-            <a:noAutofit/>
-          </a:bodyPr>
-          <a:lstStyle/>
-          <a:p>
-            <a:pPr marL="0" lvl="0" indent="0" algn="r" rtl="0">
-              <a:spcBef>
-                <a:spcPts val="0"/>
-              </a:spcBef>
-              <a:spcAft>
-                <a:spcPts val="0"/>
-              </a:spcAft>
-              <a:buNone/>
-            </a:pPr>
-            <a:fld id="{00000000-1234-1234-1234-123412341234}" type="slidenum">
-              <a:rPr lang="en-GB" sz="1000" b="1">
-                <a:solidFill>
-                  <a:srgbClr val="032F62"/>
-                </a:solidFill>
-                <a:latin typeface="Francois One"/>
-                <a:ea typeface="Francois One"/>
-                <a:cs typeface="Francois One"/>
-                <a:sym typeface="Francois One"/>
-              </a:rPr>
-              <a:t>19</a:t>
-            </a:fld>
-            <a:endParaRPr sz="1000" b="1">
-              <a:solidFill>
-                <a:srgbClr val="032F62"/>
-              </a:solidFill>
-              <a:latin typeface="Francois One"/>
-              <a:ea typeface="Francois One"/>
-              <a:cs typeface="Francois One"/>
-              <a:sym typeface="Francois One"/>
-            </a:endParaRPr>
-          </a:p>
-        </p:txBody>
-      </p:sp>
-    </p:spTree>
-    <p:extLst>
-      <p:ext uri="{BB962C8B-B14F-4D97-AF65-F5344CB8AC3E}">
-        <p14:creationId xmlns:p14="http://schemas.microsoft.com/office/powerpoint/2010/main" val="788717012"/>
-      </p:ext>
-    </p:extLst>
   </p:cSld>
   <p:clrMapOvr>
     <a:masterClrMapping/>
@@ -14997,6 +15087,114 @@
       </p:pic>
       <p:sp>
         <p:nvSpPr>
+          <p:cNvPr id="142" name="Google Shape;142;p28"/>
+          <p:cNvSpPr txBox="1">
+            <a:spLocks noGrp="1"/>
+          </p:cNvSpPr>
+          <p:nvPr>
+            <p:ph type="title"/>
+          </p:nvPr>
+        </p:nvSpPr>
+        <p:spPr>
+          <a:xfrm>
+            <a:off x="1614034" y="3611536"/>
+            <a:ext cx="6057600" cy="572700"/>
+          </a:xfrm>
+          <a:prstGeom prst="rect">
+            <a:avLst/>
+          </a:prstGeom>
+          <a:solidFill>
+            <a:srgbClr val="FBF39B"/>
+          </a:solidFill>
+          <a:ln w="19050" cap="flat" cmpd="sng">
+            <a:solidFill>
+              <a:srgbClr val="25326F"/>
+            </a:solidFill>
+            <a:prstDash val="solid"/>
+            <a:round/>
+            <a:headEnd type="none" w="sm" len="sm"/>
+            <a:tailEnd type="none" w="sm" len="sm"/>
+          </a:ln>
+        </p:spPr>
+        <p:txBody>
+          <a:bodyPr spcFirstLastPara="1" wrap="square" lIns="91425" tIns="91425" rIns="91425" bIns="91425" anchor="t" anchorCtr="0">
+            <a:noAutofit/>
+          </a:bodyPr>
+          <a:lstStyle/>
+          <a:p>
+            <a:pPr marL="0" lvl="0" indent="0" algn="ctr" rtl="0">
+              <a:spcBef>
+                <a:spcPts val="0"/>
+              </a:spcBef>
+              <a:spcAft>
+                <a:spcPts val="0"/>
+              </a:spcAft>
+              <a:buClr>
+                <a:schemeClr val="dk1"/>
+              </a:buClr>
+              <a:buSzPts val="1100"/>
+              <a:buFont typeface="Arial"/>
+              <a:buNone/>
+            </a:pPr>
+            <a:r>
+              <a:rPr lang="en-GB" sz="2400" dirty="0"/>
+              <a:t>Join </a:t>
+            </a:r>
+            <a:r>
+              <a:rPr lang="en-GB" sz="2400" dirty="0" err="1"/>
+              <a:t>Replit</a:t>
+            </a:r>
+            <a:r>
+              <a:rPr lang="en-GB" sz="2400" dirty="0"/>
+              <a:t> at </a:t>
+            </a:r>
+            <a:r>
+              <a:rPr lang="en-GB" sz="2000" b="1" u="sng" dirty="0">
+                <a:solidFill>
+                  <a:schemeClr val="hlink"/>
+                </a:solidFill>
+                <a:latin typeface="Roboto Mono"/>
+                <a:ea typeface="Roboto Mono"/>
+                <a:cs typeface="Roboto Mono"/>
+                <a:sym typeface="Roboto Mono"/>
+              </a:rPr>
+              <a:t>https://</a:t>
+            </a:r>
+            <a:r>
+              <a:rPr lang="en-GB" sz="2000" b="1" u="sng" dirty="0" err="1">
+                <a:solidFill>
+                  <a:schemeClr val="hlink"/>
+                </a:solidFill>
+                <a:latin typeface="Roboto Mono"/>
+                <a:ea typeface="Roboto Mono"/>
+                <a:cs typeface="Roboto Mono"/>
+                <a:sym typeface="Roboto Mono"/>
+              </a:rPr>
+              <a:t>replit.com</a:t>
+            </a:r>
+            <a:r>
+              <a:rPr lang="en-GB" sz="2000" b="1" u="sng" dirty="0">
+                <a:solidFill>
+                  <a:schemeClr val="hlink"/>
+                </a:solidFill>
+                <a:latin typeface="Roboto Mono"/>
+                <a:ea typeface="Roboto Mono"/>
+                <a:cs typeface="Roboto Mono"/>
+                <a:sym typeface="Roboto Mono"/>
+              </a:rPr>
+              <a:t>/</a:t>
+            </a:r>
+            <a:endParaRPr sz="2000" b="1" dirty="0">
+              <a:latin typeface="Roboto Mono"/>
+              <a:ea typeface="Roboto Mono"/>
+              <a:cs typeface="Roboto Mono"/>
+              <a:sym typeface="Roboto Mono"/>
+            </a:endParaRPr>
+          </a:p>
+        </p:txBody>
+      </p:sp>
+      <p:sp>
+        <p:nvSpPr>
           <p:cNvPr id="3" name="Google Shape;134;p27">
             <a:extLst>
               <a:ext uri="{FF2B5EF4-FFF2-40B4-BE49-F238E27FC236}">
@@ -15060,6 +15258,11 @@
         </p:txBody>
       </p:sp>
     </p:spTree>
+    <p:extLst>
+      <p:ext uri="{BB962C8B-B14F-4D97-AF65-F5344CB8AC3E}">
+        <p14:creationId xmlns:p14="http://schemas.microsoft.com/office/powerpoint/2010/main" val="2669347141"/>
+      </p:ext>
+    </p:extLst>
   </p:cSld>
   <p:clrMapOvr>
     <a:masterClrMapping/>
@@ -15068,6 +15271,651 @@
 </file>
 
 <file path=ppt/slides/slide5.xml><?xml version="1.0" encoding="utf-8"?>
+<p:sld xmlns:a="http://schemas.openxmlformats.org/drawingml/2006/main" xmlns:r="http://schemas.openxmlformats.org/officeDocument/2006/relationships" xmlns:p="http://schemas.openxmlformats.org/presentationml/2006/main">
+  <p:cSld>
+    <p:spTree>
+      <p:nvGrpSpPr>
+        <p:cNvPr id="1" name=""/>
+        <p:cNvGrpSpPr/>
+        <p:nvPr/>
+      </p:nvGrpSpPr>
+      <p:grpSpPr>
+        <a:xfrm>
+          <a:off x="0" y="0"/>
+          <a:ext cx="0" cy="0"/>
+          <a:chOff x="0" y="0"/>
+          <a:chExt cx="0" cy="0"/>
+        </a:xfrm>
+      </p:grpSpPr>
+      <p:sp>
+        <p:nvSpPr>
+          <p:cNvPr id="4" name="Google Shape;214;p36">
+            <a:extLst>
+              <a:ext uri="{FF2B5EF4-FFF2-40B4-BE49-F238E27FC236}">
+                <a16:creationId xmlns:a16="http://schemas.microsoft.com/office/drawing/2014/main" id="{99EDA7A9-097B-4B61-8CB9-9348F0A1FDD5}"/>
+              </a:ext>
+            </a:extLst>
+          </p:cNvPr>
+          <p:cNvSpPr txBox="1">
+            <a:spLocks noGrp="1"/>
+          </p:cNvSpPr>
+          <p:nvPr>
+            <p:ph type="title"/>
+          </p:nvPr>
+        </p:nvSpPr>
+        <p:spPr>
+          <a:xfrm>
+            <a:off x="311700" y="445025"/>
+            <a:ext cx="8520600" cy="572700"/>
+          </a:xfrm>
+          <a:prstGeom prst="rect">
+            <a:avLst/>
+          </a:prstGeom>
+        </p:spPr>
+        <p:txBody>
+          <a:bodyPr spcFirstLastPara="1" wrap="square" lIns="91425" tIns="91425" rIns="91425" bIns="91425" anchor="t" anchorCtr="0">
+            <a:noAutofit/>
+          </a:bodyPr>
+          <a:lstStyle/>
+          <a:p>
+            <a:pPr marL="0" lvl="0" indent="0" algn="l" rtl="0">
+              <a:spcBef>
+                <a:spcPts val="0"/>
+              </a:spcBef>
+              <a:spcAft>
+                <a:spcPts val="0"/>
+              </a:spcAft>
+              <a:buClr>
+                <a:schemeClr val="dk1"/>
+              </a:buClr>
+              <a:buSzPts val="1100"/>
+              <a:buFont typeface="Arial"/>
+              <a:buNone/>
+            </a:pPr>
+            <a:r>
+              <a:rPr lang="en-GB"/>
+              <a:t>Activity 02.01 - My Favourite Animal</a:t>
+            </a:r>
+            <a:endParaRPr/>
+          </a:p>
+          <a:p>
+            <a:pPr marL="0" lvl="0" indent="0" algn="l" rtl="0">
+              <a:spcBef>
+                <a:spcPts val="0"/>
+              </a:spcBef>
+              <a:spcAft>
+                <a:spcPts val="0"/>
+              </a:spcAft>
+              <a:buNone/>
+            </a:pPr>
+            <a:endParaRPr/>
+          </a:p>
+        </p:txBody>
+      </p:sp>
+      <p:sp>
+        <p:nvSpPr>
+          <p:cNvPr id="5" name="Google Shape;215;p36">
+            <a:extLst>
+              <a:ext uri="{FF2B5EF4-FFF2-40B4-BE49-F238E27FC236}">
+                <a16:creationId xmlns:a16="http://schemas.microsoft.com/office/drawing/2014/main" id="{CCAE2676-1E03-4E99-9574-8E8DA436F4AE}"/>
+              </a:ext>
+            </a:extLst>
+          </p:cNvPr>
+          <p:cNvSpPr txBox="1">
+            <a:spLocks noGrp="1"/>
+          </p:cNvSpPr>
+          <p:nvPr>
+            <p:ph type="body" idx="1"/>
+          </p:nvPr>
+        </p:nvSpPr>
+        <p:spPr>
+          <a:xfrm>
+            <a:off x="311700" y="1152475"/>
+            <a:ext cx="8520600" cy="861300"/>
+          </a:xfrm>
+          <a:prstGeom prst="rect">
+            <a:avLst/>
+          </a:prstGeom>
+        </p:spPr>
+        <p:txBody>
+          <a:bodyPr spcFirstLastPara="1" wrap="square" lIns="91425" tIns="91425" rIns="91425" bIns="91425" anchor="t" anchorCtr="0">
+            <a:noAutofit/>
+          </a:bodyPr>
+          <a:lstStyle/>
+          <a:p>
+            <a:pPr marL="0" lvl="0" indent="0" algn="l" rtl="0">
+              <a:spcBef>
+                <a:spcPts val="0"/>
+              </a:spcBef>
+              <a:spcAft>
+                <a:spcPts val="1600"/>
+              </a:spcAft>
+              <a:buNone/>
+            </a:pPr>
+            <a:r>
+              <a:rPr lang="en-GB"/>
+              <a:t>Your first task is to update the following web page to highlight your favourite animal.</a:t>
+            </a:r>
+            <a:endParaRPr/>
+          </a:p>
+        </p:txBody>
+      </p:sp>
+      <p:grpSp>
+        <p:nvGrpSpPr>
+          <p:cNvPr id="6" name="Google Shape;216;p36">
+            <a:extLst>
+              <a:ext uri="{FF2B5EF4-FFF2-40B4-BE49-F238E27FC236}">
+                <a16:creationId xmlns:a16="http://schemas.microsoft.com/office/drawing/2014/main" id="{7D60765A-D559-4479-B02F-185E2832DC64}"/>
+              </a:ext>
+            </a:extLst>
+          </p:cNvPr>
+          <p:cNvGrpSpPr/>
+          <p:nvPr/>
+        </p:nvGrpSpPr>
+        <p:grpSpPr>
+          <a:xfrm>
+            <a:off x="7984201" y="4195474"/>
+            <a:ext cx="884557" cy="861343"/>
+            <a:chOff x="7984201" y="4195474"/>
+            <a:chExt cx="884557" cy="861343"/>
+          </a:xfrm>
+        </p:grpSpPr>
+        <p:sp>
+          <p:nvSpPr>
+            <p:cNvPr id="7" name="Google Shape;217;p36">
+              <a:extLst>
+                <a:ext uri="{FF2B5EF4-FFF2-40B4-BE49-F238E27FC236}">
+                  <a16:creationId xmlns:a16="http://schemas.microsoft.com/office/drawing/2014/main" id="{2FF0A7F1-FE8B-4600-BB21-695EE465CD3A}"/>
+                </a:ext>
+              </a:extLst>
+            </p:cNvPr>
+            <p:cNvSpPr txBox="1"/>
+            <p:nvPr/>
+          </p:nvSpPr>
+          <p:spPr>
+            <a:xfrm>
+              <a:off x="8320058" y="4663217"/>
+              <a:ext cx="548700" cy="393600"/>
+            </a:xfrm>
+            <a:prstGeom prst="rect">
+              <a:avLst/>
+            </a:prstGeom>
+            <a:noFill/>
+            <a:ln>
+              <a:noFill/>
+            </a:ln>
+          </p:spPr>
+          <p:txBody>
+            <a:bodyPr spcFirstLastPara="1" wrap="square" lIns="91425" tIns="91425" rIns="91425" bIns="91425" anchor="ctr" anchorCtr="0">
+              <a:noAutofit/>
+            </a:bodyPr>
+            <a:lstStyle/>
+            <a:p>
+              <a:pPr marL="0" lvl="0" indent="0" algn="r" rtl="0">
+                <a:spcBef>
+                  <a:spcPts val="0"/>
+                </a:spcBef>
+                <a:spcAft>
+                  <a:spcPts val="0"/>
+                </a:spcAft>
+                <a:buNone/>
+              </a:pPr>
+              <a:fld id="{00000000-1234-1234-1234-123412341234}" type="slidenum">
+                <a:rPr lang="en-GB" sz="1000" b="1">
+                  <a:solidFill>
+                    <a:srgbClr val="032F62"/>
+                  </a:solidFill>
+                  <a:latin typeface="Francois One"/>
+                  <a:ea typeface="Francois One"/>
+                  <a:cs typeface="Francois One"/>
+                  <a:sym typeface="Francois One"/>
+                </a:rPr>
+                <a:t>5</a:t>
+              </a:fld>
+              <a:endParaRPr sz="1000" b="1">
+                <a:solidFill>
+                  <a:srgbClr val="032F62"/>
+                </a:solidFill>
+                <a:latin typeface="Francois One"/>
+                <a:ea typeface="Francois One"/>
+                <a:cs typeface="Francois One"/>
+                <a:sym typeface="Francois One"/>
+              </a:endParaRPr>
+            </a:p>
+          </p:txBody>
+        </p:sp>
+        <p:pic>
+          <p:nvPicPr>
+            <p:cNvPr id="8" name="Google Shape;218;p36">
+              <a:extLst>
+                <a:ext uri="{FF2B5EF4-FFF2-40B4-BE49-F238E27FC236}">
+                  <a16:creationId xmlns:a16="http://schemas.microsoft.com/office/drawing/2014/main" id="{DB467A73-DB80-4D3B-BD71-B89666D1A698}"/>
+                </a:ext>
+              </a:extLst>
+            </p:cNvPr>
+            <p:cNvPicPr preferRelativeResize="0"/>
+            <p:nvPr/>
+          </p:nvPicPr>
+          <p:blipFill rotWithShape="1">
+            <a:blip r:embed="rId2">
+              <a:alphaModFix/>
+            </a:blip>
+            <a:srcRect b="19478"/>
+            <a:stretch/>
+          </p:blipFill>
+          <p:spPr>
+            <a:xfrm>
+              <a:off x="7984201" y="4195474"/>
+              <a:ext cx="757577" cy="753053"/>
+            </a:xfrm>
+            <a:prstGeom prst="rect">
+              <a:avLst/>
+            </a:prstGeom>
+            <a:noFill/>
+            <a:ln>
+              <a:noFill/>
+            </a:ln>
+          </p:spPr>
+        </p:pic>
+      </p:grpSp>
+      <p:sp>
+        <p:nvSpPr>
+          <p:cNvPr id="9" name="Google Shape;219;p36">
+            <a:extLst>
+              <a:ext uri="{FF2B5EF4-FFF2-40B4-BE49-F238E27FC236}">
+                <a16:creationId xmlns:a16="http://schemas.microsoft.com/office/drawing/2014/main" id="{C5CF1156-2F35-4556-A4BE-A6ED7F0D53FD}"/>
+              </a:ext>
+            </a:extLst>
+          </p:cNvPr>
+          <p:cNvSpPr txBox="1"/>
+          <p:nvPr/>
+        </p:nvSpPr>
+        <p:spPr>
+          <a:xfrm>
+            <a:off x="311700" y="4154100"/>
+            <a:ext cx="8382300" cy="943818"/>
+          </a:xfrm>
+          <a:prstGeom prst="rect">
+            <a:avLst/>
+          </a:prstGeom>
+          <a:noFill/>
+          <a:ln>
+            <a:noFill/>
+          </a:ln>
+        </p:spPr>
+        <p:txBody>
+          <a:bodyPr spcFirstLastPara="1" wrap="square" lIns="91425" tIns="91425" rIns="91425" bIns="91425" anchor="t" anchorCtr="0">
+            <a:spAutoFit/>
+          </a:bodyPr>
+          <a:lstStyle/>
+          <a:p>
+            <a:pPr marL="0" lvl="0" indent="0" algn="ctr" rtl="0">
+              <a:spcBef>
+                <a:spcPts val="0"/>
+              </a:spcBef>
+              <a:spcAft>
+                <a:spcPts val="1600"/>
+              </a:spcAft>
+              <a:buNone/>
+            </a:pPr>
+            <a:r>
+              <a:rPr lang="en-GB" sz="1800" dirty="0">
+                <a:solidFill>
+                  <a:schemeClr val="dk2"/>
+                </a:solidFill>
+                <a:latin typeface="Roboto"/>
+                <a:ea typeface="Roboto"/>
+                <a:cs typeface="Roboto"/>
+                <a:sym typeface="Roboto"/>
+              </a:rPr>
+              <a:t>Complete Repl.it Activity:</a:t>
+            </a:r>
+            <a:br>
+              <a:rPr lang="en-GB" sz="1800" dirty="0">
+                <a:latin typeface="Roboto"/>
+                <a:ea typeface="Roboto"/>
+                <a:cs typeface="Roboto"/>
+                <a:sym typeface="Roboto"/>
+              </a:rPr>
+            </a:br>
+            <a:r>
+              <a:rPr lang="en-GB" sz="1800" u="sng" dirty="0">
+                <a:solidFill>
+                  <a:schemeClr val="hlink"/>
+                </a:solidFill>
+                <a:latin typeface="Roboto"/>
+                <a:ea typeface="Roboto"/>
+                <a:cs typeface="Roboto"/>
+                <a:sym typeface="Roboto"/>
+                <a:hlinkClick r:id="rId3"/>
+              </a:rPr>
+              <a:t>02.01 - My Favourite Animal</a:t>
+            </a:r>
+            <a:endParaRPr sz="1800" dirty="0">
+              <a:latin typeface="Roboto"/>
+              <a:ea typeface="Roboto"/>
+              <a:cs typeface="Roboto"/>
+              <a:sym typeface="Roboto"/>
+            </a:endParaRPr>
+          </a:p>
+        </p:txBody>
+      </p:sp>
+      <p:pic>
+        <p:nvPicPr>
+          <p:cNvPr id="10" name="Google Shape;220;p36">
+            <a:extLst>
+              <a:ext uri="{FF2B5EF4-FFF2-40B4-BE49-F238E27FC236}">
+                <a16:creationId xmlns:a16="http://schemas.microsoft.com/office/drawing/2014/main" id="{C06AD7B1-095E-4390-ACB9-3DCD8092CA8B}"/>
+              </a:ext>
+            </a:extLst>
+          </p:cNvPr>
+          <p:cNvPicPr preferRelativeResize="0"/>
+          <p:nvPr/>
+        </p:nvPicPr>
+        <p:blipFill>
+          <a:blip r:embed="rId4">
+            <a:alphaModFix/>
+          </a:blip>
+          <a:stretch>
+            <a:fillRect/>
+          </a:stretch>
+        </p:blipFill>
+        <p:spPr>
+          <a:xfrm>
+            <a:off x="2959863" y="1755200"/>
+            <a:ext cx="3224274" cy="2359600"/>
+          </a:xfrm>
+          <a:prstGeom prst="rect">
+            <a:avLst/>
+          </a:prstGeom>
+          <a:noFill/>
+          <a:ln>
+            <a:noFill/>
+          </a:ln>
+        </p:spPr>
+      </p:pic>
+      <p:grpSp>
+        <p:nvGrpSpPr>
+          <p:cNvPr id="11" name="Google Shape;221;p36">
+            <a:extLst>
+              <a:ext uri="{FF2B5EF4-FFF2-40B4-BE49-F238E27FC236}">
+                <a16:creationId xmlns:a16="http://schemas.microsoft.com/office/drawing/2014/main" id="{35BCE3A3-8A59-476D-8EF5-A7EFDA46CD22}"/>
+              </a:ext>
+            </a:extLst>
+          </p:cNvPr>
+          <p:cNvGrpSpPr/>
+          <p:nvPr/>
+        </p:nvGrpSpPr>
+        <p:grpSpPr>
+          <a:xfrm>
+            <a:off x="6509068" y="1638436"/>
+            <a:ext cx="2323365" cy="2430042"/>
+            <a:chOff x="6173075" y="716158"/>
+            <a:chExt cx="2659225" cy="2960217"/>
+          </a:xfrm>
+        </p:grpSpPr>
+        <p:pic>
+          <p:nvPicPr>
+            <p:cNvPr id="12" name="Google Shape;222;p36">
+              <a:extLst>
+                <a:ext uri="{FF2B5EF4-FFF2-40B4-BE49-F238E27FC236}">
+                  <a16:creationId xmlns:a16="http://schemas.microsoft.com/office/drawing/2014/main" id="{5B6D48C6-8570-4848-AC6D-71A48C8A733D}"/>
+                </a:ext>
+              </a:extLst>
+            </p:cNvPr>
+            <p:cNvPicPr preferRelativeResize="0"/>
+            <p:nvPr/>
+          </p:nvPicPr>
+          <p:blipFill>
+            <a:blip r:embed="rId5">
+              <a:alphaModFix/>
+            </a:blip>
+            <a:stretch>
+              <a:fillRect/>
+            </a:stretch>
+          </p:blipFill>
+          <p:spPr>
+            <a:xfrm>
+              <a:off x="6173075" y="1237975"/>
+              <a:ext cx="2659225" cy="2438400"/>
+            </a:xfrm>
+            <a:prstGeom prst="rect">
+              <a:avLst/>
+            </a:prstGeom>
+            <a:noFill/>
+            <a:ln>
+              <a:noFill/>
+            </a:ln>
+          </p:spPr>
+        </p:pic>
+        <p:pic>
+          <p:nvPicPr>
+            <p:cNvPr id="13" name="Google Shape;223;p36">
+              <a:extLst>
+                <a:ext uri="{FF2B5EF4-FFF2-40B4-BE49-F238E27FC236}">
+                  <a16:creationId xmlns:a16="http://schemas.microsoft.com/office/drawing/2014/main" id="{08259BE2-CD25-4DD1-83AD-25D68777354D}"/>
+                </a:ext>
+              </a:extLst>
+            </p:cNvPr>
+            <p:cNvPicPr preferRelativeResize="0"/>
+            <p:nvPr/>
+          </p:nvPicPr>
+          <p:blipFill>
+            <a:blip r:embed="rId6">
+              <a:alphaModFix/>
+            </a:blip>
+            <a:stretch>
+              <a:fillRect/>
+            </a:stretch>
+          </p:blipFill>
+          <p:spPr>
+            <a:xfrm rot="2700000">
+              <a:off x="7403275" y="847650"/>
+              <a:ext cx="634900" cy="634900"/>
+            </a:xfrm>
+            <a:prstGeom prst="rect">
+              <a:avLst/>
+            </a:prstGeom>
+            <a:noFill/>
+            <a:ln>
+              <a:noFill/>
+            </a:ln>
+          </p:spPr>
+        </p:pic>
+        <p:sp>
+          <p:nvSpPr>
+            <p:cNvPr id="14" name="Google Shape;224;p36">
+              <a:extLst>
+                <a:ext uri="{FF2B5EF4-FFF2-40B4-BE49-F238E27FC236}">
+                  <a16:creationId xmlns:a16="http://schemas.microsoft.com/office/drawing/2014/main" id="{E525370C-394F-476C-AA98-AA2120A4FE72}"/>
+                </a:ext>
+              </a:extLst>
+            </p:cNvPr>
+            <p:cNvSpPr txBox="1"/>
+            <p:nvPr/>
+          </p:nvSpPr>
+          <p:spPr>
+            <a:xfrm>
+              <a:off x="6746838" y="1467475"/>
+              <a:ext cx="1511700" cy="393600"/>
+            </a:xfrm>
+            <a:prstGeom prst="rect">
+              <a:avLst/>
+            </a:prstGeom>
+            <a:noFill/>
+            <a:ln>
+              <a:noFill/>
+            </a:ln>
+          </p:spPr>
+          <p:txBody>
+            <a:bodyPr spcFirstLastPara="1" wrap="square" lIns="91425" tIns="91425" rIns="91425" bIns="91425" anchor="t" anchorCtr="0">
+              <a:noAutofit/>
+            </a:bodyPr>
+            <a:lstStyle/>
+            <a:p>
+              <a:pPr marL="0" lvl="0" indent="0" algn="ctr" rtl="0">
+                <a:lnSpc>
+                  <a:spcPct val="150000"/>
+                </a:lnSpc>
+                <a:spcBef>
+                  <a:spcPts val="0"/>
+                </a:spcBef>
+                <a:spcAft>
+                  <a:spcPts val="1600"/>
+                </a:spcAft>
+                <a:buNone/>
+              </a:pPr>
+              <a:r>
+                <a:rPr lang="en-GB" b="1">
+                  <a:solidFill>
+                    <a:srgbClr val="595959"/>
+                  </a:solidFill>
+                  <a:latin typeface="Roboto"/>
+                  <a:ea typeface="Roboto"/>
+                  <a:cs typeface="Roboto"/>
+                  <a:sym typeface="Roboto"/>
+                </a:rPr>
+                <a:t>Activity hint!</a:t>
+              </a:r>
+              <a:endParaRPr b="1">
+                <a:solidFill>
+                  <a:srgbClr val="595959"/>
+                </a:solidFill>
+                <a:latin typeface="Roboto"/>
+                <a:ea typeface="Roboto"/>
+                <a:cs typeface="Roboto"/>
+                <a:sym typeface="Roboto"/>
+              </a:endParaRPr>
+            </a:p>
+          </p:txBody>
+        </p:sp>
+        <p:sp>
+          <p:nvSpPr>
+            <p:cNvPr id="15" name="Google Shape;225;p36">
+              <a:extLst>
+                <a:ext uri="{FF2B5EF4-FFF2-40B4-BE49-F238E27FC236}">
+                  <a16:creationId xmlns:a16="http://schemas.microsoft.com/office/drawing/2014/main" id="{E96B4A70-69E0-4FDB-9AB9-86BBA8CB7359}"/>
+                </a:ext>
+              </a:extLst>
+            </p:cNvPr>
+            <p:cNvSpPr txBox="1"/>
+            <p:nvPr/>
+          </p:nvSpPr>
+          <p:spPr>
+            <a:xfrm>
+              <a:off x="6184175" y="1861075"/>
+              <a:ext cx="2498400" cy="1215000"/>
+            </a:xfrm>
+            <a:prstGeom prst="rect">
+              <a:avLst/>
+            </a:prstGeom>
+            <a:noFill/>
+            <a:ln>
+              <a:noFill/>
+            </a:ln>
+          </p:spPr>
+          <p:txBody>
+            <a:bodyPr spcFirstLastPara="1" wrap="square" lIns="91425" tIns="91425" rIns="91425" bIns="91425" anchor="t" anchorCtr="0">
+              <a:noAutofit/>
+            </a:bodyPr>
+            <a:lstStyle/>
+            <a:p>
+              <a:pPr marL="457200" lvl="0" indent="-304800" algn="l" rtl="0">
+                <a:lnSpc>
+                  <a:spcPct val="150000"/>
+                </a:lnSpc>
+                <a:spcBef>
+                  <a:spcPts val="0"/>
+                </a:spcBef>
+                <a:spcAft>
+                  <a:spcPts val="0"/>
+                </a:spcAft>
+                <a:buClr>
+                  <a:srgbClr val="595959"/>
+                </a:buClr>
+                <a:buSzPts val="1200"/>
+                <a:buFont typeface="Roboto"/>
+                <a:buChar char="●"/>
+              </a:pPr>
+              <a:r>
+                <a:rPr lang="en-GB" sz="1200">
+                  <a:solidFill>
+                    <a:srgbClr val="595959"/>
+                  </a:solidFill>
+                  <a:latin typeface="Roboto"/>
+                  <a:ea typeface="Roboto"/>
+                  <a:cs typeface="Roboto"/>
+                  <a:sym typeface="Roboto"/>
+                </a:rPr>
+                <a:t>Need some help?</a:t>
+              </a:r>
+              <a:endParaRPr sz="1200">
+                <a:solidFill>
+                  <a:srgbClr val="595959"/>
+                </a:solidFill>
+                <a:latin typeface="Roboto"/>
+                <a:ea typeface="Roboto"/>
+                <a:cs typeface="Roboto"/>
+                <a:sym typeface="Roboto"/>
+              </a:endParaRPr>
+            </a:p>
+            <a:p>
+              <a:pPr marL="457200" lvl="0" indent="-304800" algn="l" rtl="0">
+                <a:lnSpc>
+                  <a:spcPct val="150000"/>
+                </a:lnSpc>
+                <a:spcBef>
+                  <a:spcPts val="0"/>
+                </a:spcBef>
+                <a:spcAft>
+                  <a:spcPts val="0"/>
+                </a:spcAft>
+                <a:buClr>
+                  <a:srgbClr val="595959"/>
+                </a:buClr>
+                <a:buSzPts val="1200"/>
+                <a:buFont typeface="Roboto"/>
+                <a:buChar char="●"/>
+              </a:pPr>
+              <a:r>
+                <a:rPr lang="en-GB" sz="1200">
+                  <a:solidFill>
+                    <a:srgbClr val="595959"/>
+                  </a:solidFill>
+                  <a:latin typeface="Roboto"/>
+                  <a:ea typeface="Roboto"/>
+                  <a:cs typeface="Roboto"/>
+                  <a:sym typeface="Roboto"/>
+                </a:rPr>
+                <a:t>See the next slide.</a:t>
+              </a:r>
+              <a:endParaRPr sz="1200">
+                <a:solidFill>
+                  <a:srgbClr val="595959"/>
+                </a:solidFill>
+                <a:latin typeface="Roboto"/>
+                <a:ea typeface="Roboto"/>
+                <a:cs typeface="Roboto"/>
+                <a:sym typeface="Roboto"/>
+              </a:endParaRPr>
+            </a:p>
+          </p:txBody>
+        </p:sp>
+      </p:grpSp>
+    </p:spTree>
+    <p:extLst>
+      <p:ext uri="{BB962C8B-B14F-4D97-AF65-F5344CB8AC3E}">
+        <p14:creationId xmlns:p14="http://schemas.microsoft.com/office/powerpoint/2010/main" val="41790663"/>
+      </p:ext>
+    </p:extLst>
+  </p:cSld>
+  <p:clrMapOvr>
+    <a:masterClrMapping/>
+  </p:clrMapOvr>
+</p:sld>
+</file>
+
+<file path=ppt/slides/slide6.xml><?xml version="1.0" encoding="utf-8"?>
 <p:sld xmlns:a="http://schemas.openxmlformats.org/drawingml/2006/main" xmlns:r="http://schemas.openxmlformats.org/officeDocument/2006/relationships" xmlns:p="http://schemas.openxmlformats.org/presentationml/2006/main">
   <p:cSld>
     <p:spTree>
@@ -15170,7 +16018,7 @@
                 <a:cs typeface="Francois One"/>
                 <a:sym typeface="Francois One"/>
               </a:rPr>
-              <a:t>5</a:t>
+              <a:t>6</a:t>
             </a:fld>
             <a:endParaRPr sz="1000" b="1">
               <a:solidFill>
@@ -15306,7 +16154,7 @@
 </p:sld>
 </file>
 
-<file path=ppt/slides/slide6.xml><?xml version="1.0" encoding="utf-8"?>
+<file path=ppt/slides/slide7.xml><?xml version="1.0" encoding="utf-8"?>
 <p:sld xmlns:a="http://schemas.openxmlformats.org/drawingml/2006/main" xmlns:r="http://schemas.openxmlformats.org/officeDocument/2006/relationships" xmlns:p="http://schemas.openxmlformats.org/presentationml/2006/main">
   <p:cSld>
     <p:spTree>
@@ -15409,7 +16257,7 @@
                 <a:cs typeface="Francois One"/>
                 <a:sym typeface="Francois One"/>
               </a:rPr>
-              <a:t>6</a:t>
+              <a:t>7</a:t>
             </a:fld>
             <a:endParaRPr sz="1000" b="1">
               <a:solidFill>
@@ -15774,7 +16622,7 @@
 </p:sld>
 </file>
 
-<file path=ppt/slides/slide7.xml><?xml version="1.0" encoding="utf-8"?>
+<file path=ppt/slides/slide8.xml><?xml version="1.0" encoding="utf-8"?>
 <p:sld xmlns:a="http://schemas.openxmlformats.org/drawingml/2006/main" xmlns:r="http://schemas.openxmlformats.org/officeDocument/2006/relationships" xmlns:p="http://schemas.openxmlformats.org/presentationml/2006/main">
   <p:cSld>
     <p:spTree>
@@ -15877,7 +16725,7 @@
                 <a:cs typeface="Francois One"/>
                 <a:sym typeface="Francois One"/>
               </a:rPr>
-              <a:t>7</a:t>
+              <a:t>8</a:t>
             </a:fld>
             <a:endParaRPr sz="1000" b="1">
               <a:solidFill>
@@ -16306,7 +17154,7 @@
 </p:sld>
 </file>
 
-<file path=ppt/slides/slide8.xml><?xml version="1.0" encoding="utf-8"?>
+<file path=ppt/slides/slide9.xml><?xml version="1.0" encoding="utf-8"?>
 <p:sld xmlns:a="http://schemas.openxmlformats.org/drawingml/2006/main" xmlns:r="http://schemas.openxmlformats.org/officeDocument/2006/relationships" xmlns:p="http://schemas.openxmlformats.org/presentationml/2006/main">
   <p:cSld>
     <p:spTree>
@@ -16409,7 +17257,7 @@
                 <a:cs typeface="Francois One"/>
                 <a:sym typeface="Francois One"/>
               </a:rPr>
-              <a:t>8</a:t>
+              <a:t>9</a:t>
             </a:fld>
             <a:endParaRPr sz="1000" b="1">
               <a:solidFill>
@@ -16651,476 +17499,6 @@
               <a:buNone/>
             </a:pPr>
             <a:endParaRPr/>
-          </a:p>
-        </p:txBody>
-      </p:sp>
-    </p:spTree>
-  </p:cSld>
-  <p:clrMapOvr>
-    <a:masterClrMapping/>
-  </p:clrMapOvr>
-</p:sld>
-</file>
-
-<file path=ppt/slides/slide9.xml><?xml version="1.0" encoding="utf-8"?>
-<p:sld xmlns:a="http://schemas.openxmlformats.org/drawingml/2006/main" xmlns:r="http://schemas.openxmlformats.org/officeDocument/2006/relationships" xmlns:p="http://schemas.openxmlformats.org/presentationml/2006/main">
-  <p:cSld>
-    <p:spTree>
-      <p:nvGrpSpPr>
-        <p:cNvPr id="1" name="Shape 289"/>
-        <p:cNvGrpSpPr/>
-        <p:nvPr/>
-      </p:nvGrpSpPr>
-      <p:grpSpPr>
-        <a:xfrm>
-          <a:off x="0" y="0"/>
-          <a:ext cx="0" cy="0"/>
-          <a:chOff x="0" y="0"/>
-          <a:chExt cx="0" cy="0"/>
-        </a:xfrm>
-      </p:grpSpPr>
-      <p:sp>
-        <p:nvSpPr>
-          <p:cNvPr id="290" name="Google Shape;290;p42"/>
-          <p:cNvSpPr txBox="1">
-            <a:spLocks noGrp="1"/>
-          </p:cNvSpPr>
-          <p:nvPr>
-            <p:ph type="title"/>
-          </p:nvPr>
-        </p:nvSpPr>
-        <p:spPr>
-          <a:xfrm>
-            <a:off x="311700" y="445025"/>
-            <a:ext cx="8520600" cy="572700"/>
-          </a:xfrm>
-          <a:prstGeom prst="rect">
-            <a:avLst/>
-          </a:prstGeom>
-        </p:spPr>
-        <p:txBody>
-          <a:bodyPr spcFirstLastPara="1" wrap="square" lIns="91425" tIns="91425" rIns="91425" bIns="91425" anchor="t" anchorCtr="0">
-            <a:noAutofit/>
-          </a:bodyPr>
-          <a:lstStyle/>
-          <a:p>
-            <a:pPr marL="0" lvl="0" indent="0" algn="l" rtl="0">
-              <a:spcBef>
-                <a:spcPts val="0"/>
-              </a:spcBef>
-              <a:spcAft>
-                <a:spcPts val="0"/>
-              </a:spcAft>
-              <a:buNone/>
-            </a:pPr>
-            <a:r>
-              <a:rPr lang="en-GB"/>
-              <a:t>Basic HTML Structure - Head tag</a:t>
-            </a:r>
-            <a:endParaRPr/>
-          </a:p>
-        </p:txBody>
-      </p:sp>
-      <p:sp>
-        <p:nvSpPr>
-          <p:cNvPr id="292" name="Google Shape;292;p42"/>
-          <p:cNvSpPr txBox="1"/>
-          <p:nvPr/>
-        </p:nvSpPr>
-        <p:spPr>
-          <a:xfrm>
-            <a:off x="8320058" y="4663217"/>
-            <a:ext cx="548700" cy="393600"/>
-          </a:xfrm>
-          <a:prstGeom prst="rect">
-            <a:avLst/>
-          </a:prstGeom>
-          <a:noFill/>
-          <a:ln>
-            <a:noFill/>
-          </a:ln>
-        </p:spPr>
-        <p:txBody>
-          <a:bodyPr spcFirstLastPara="1" wrap="square" lIns="91425" tIns="91425" rIns="91425" bIns="91425" anchor="ctr" anchorCtr="0">
-            <a:noAutofit/>
-          </a:bodyPr>
-          <a:lstStyle/>
-          <a:p>
-            <a:pPr marL="0" lvl="0" indent="0" algn="r" rtl="0">
-              <a:spcBef>
-                <a:spcPts val="0"/>
-              </a:spcBef>
-              <a:spcAft>
-                <a:spcPts val="0"/>
-              </a:spcAft>
-              <a:buNone/>
-            </a:pPr>
-            <a:fld id="{00000000-1234-1234-1234-123412341234}" type="slidenum">
-              <a:rPr lang="en-GB" sz="1000" b="1">
-                <a:solidFill>
-                  <a:srgbClr val="032F62"/>
-                </a:solidFill>
-                <a:latin typeface="Francois One"/>
-                <a:ea typeface="Francois One"/>
-                <a:cs typeface="Francois One"/>
-                <a:sym typeface="Francois One"/>
-              </a:rPr>
-              <a:t>9</a:t>
-            </a:fld>
-            <a:endParaRPr sz="1000" b="1">
-              <a:solidFill>
-                <a:srgbClr val="032F62"/>
-              </a:solidFill>
-              <a:latin typeface="Francois One"/>
-              <a:ea typeface="Francois One"/>
-              <a:cs typeface="Francois One"/>
-              <a:sym typeface="Francois One"/>
-            </a:endParaRPr>
-          </a:p>
-        </p:txBody>
-      </p:sp>
-      <p:sp>
-        <p:nvSpPr>
-          <p:cNvPr id="294" name="Google Shape;294;p42"/>
-          <p:cNvSpPr txBox="1"/>
-          <p:nvPr/>
-        </p:nvSpPr>
-        <p:spPr>
-          <a:xfrm>
-            <a:off x="5109000" y="1347800"/>
-            <a:ext cx="3723300" cy="2055000"/>
-          </a:xfrm>
-          <a:prstGeom prst="rect">
-            <a:avLst/>
-          </a:prstGeom>
-          <a:noFill/>
-          <a:ln>
-            <a:noFill/>
-          </a:ln>
-        </p:spPr>
-        <p:txBody>
-          <a:bodyPr spcFirstLastPara="1" wrap="square" lIns="91425" tIns="91425" rIns="91425" bIns="91425" anchor="t" anchorCtr="0">
-            <a:spAutoFit/>
-          </a:bodyPr>
-          <a:lstStyle/>
-          <a:p>
-            <a:pPr marL="0" lvl="0" indent="0" algn="l" rtl="0">
-              <a:lnSpc>
-                <a:spcPct val="115000"/>
-              </a:lnSpc>
-              <a:spcBef>
-                <a:spcPts val="0"/>
-              </a:spcBef>
-              <a:spcAft>
-                <a:spcPts val="0"/>
-              </a:spcAft>
-              <a:buNone/>
-            </a:pPr>
-            <a:r>
-              <a:rPr lang="en-GB" sz="1800">
-                <a:solidFill>
-                  <a:srgbClr val="595959"/>
-                </a:solidFill>
-                <a:latin typeface="Roboto"/>
-                <a:ea typeface="Roboto"/>
-                <a:cs typeface="Roboto"/>
-                <a:sym typeface="Roboto"/>
-              </a:rPr>
-              <a:t>Similarly, the </a:t>
-            </a:r>
-            <a:r>
-              <a:rPr lang="en-GB" sz="1800">
-                <a:solidFill>
-                  <a:srgbClr val="980000"/>
-                </a:solidFill>
-                <a:latin typeface="Roboto Mono"/>
-                <a:ea typeface="Roboto Mono"/>
-                <a:cs typeface="Roboto Mono"/>
-                <a:sym typeface="Roboto Mono"/>
-              </a:rPr>
-              <a:t>&lt;head&gt;</a:t>
-            </a:r>
-            <a:r>
-              <a:rPr lang="en-GB" sz="1800">
-                <a:solidFill>
-                  <a:srgbClr val="595959"/>
-                </a:solidFill>
-                <a:latin typeface="Roboto"/>
-                <a:ea typeface="Roboto"/>
-                <a:cs typeface="Roboto"/>
-                <a:sym typeface="Roboto"/>
-              </a:rPr>
-              <a:t> element is a container for metadata. </a:t>
-            </a:r>
-            <a:endParaRPr sz="1800">
-              <a:solidFill>
-                <a:srgbClr val="595959"/>
-              </a:solidFill>
-              <a:latin typeface="Roboto"/>
-              <a:ea typeface="Roboto"/>
-              <a:cs typeface="Roboto"/>
-              <a:sym typeface="Roboto"/>
-            </a:endParaRPr>
-          </a:p>
-          <a:p>
-            <a:pPr marL="0" lvl="0" indent="0" algn="l" rtl="0">
-              <a:lnSpc>
-                <a:spcPct val="115000"/>
-              </a:lnSpc>
-              <a:spcBef>
-                <a:spcPts val="0"/>
-              </a:spcBef>
-              <a:spcAft>
-                <a:spcPts val="0"/>
-              </a:spcAft>
-              <a:buNone/>
-            </a:pPr>
-            <a:endParaRPr sz="1800">
-              <a:solidFill>
-                <a:srgbClr val="595959"/>
-              </a:solidFill>
-              <a:latin typeface="Roboto"/>
-              <a:ea typeface="Roboto"/>
-              <a:cs typeface="Roboto"/>
-              <a:sym typeface="Roboto"/>
-            </a:endParaRPr>
-          </a:p>
-          <a:p>
-            <a:pPr marL="0" lvl="0" indent="0" algn="l" rtl="0">
-              <a:lnSpc>
-                <a:spcPct val="115000"/>
-              </a:lnSpc>
-              <a:spcBef>
-                <a:spcPts val="0"/>
-              </a:spcBef>
-              <a:spcAft>
-                <a:spcPts val="0"/>
-              </a:spcAft>
-              <a:buNone/>
-            </a:pPr>
-            <a:r>
-              <a:rPr lang="en-GB" sz="1800">
-                <a:solidFill>
-                  <a:srgbClr val="595959"/>
-                </a:solidFill>
-                <a:latin typeface="Roboto"/>
-                <a:ea typeface="Roboto"/>
-                <a:cs typeface="Roboto"/>
-                <a:sym typeface="Roboto"/>
-              </a:rPr>
-              <a:t>Here we use it to set the title of the webpage, which gets displayed in the tab of your browser.</a:t>
-            </a:r>
-            <a:endParaRPr sz="1800">
-              <a:solidFill>
-                <a:srgbClr val="595959"/>
-              </a:solidFill>
-              <a:latin typeface="Roboto"/>
-              <a:ea typeface="Roboto"/>
-              <a:cs typeface="Roboto"/>
-              <a:sym typeface="Roboto"/>
-            </a:endParaRPr>
-          </a:p>
-        </p:txBody>
-      </p:sp>
-      <p:pic>
-        <p:nvPicPr>
-          <p:cNvPr id="295" name="Google Shape;295;p42"/>
-          <p:cNvPicPr preferRelativeResize="0"/>
-          <p:nvPr/>
-        </p:nvPicPr>
-        <p:blipFill>
-          <a:blip r:embed="rId3">
-            <a:alphaModFix/>
-          </a:blip>
-          <a:stretch>
-            <a:fillRect/>
-          </a:stretch>
-        </p:blipFill>
-        <p:spPr>
-          <a:xfrm>
-            <a:off x="311700" y="1347788"/>
-            <a:ext cx="4619625" cy="2447925"/>
-          </a:xfrm>
-          <a:prstGeom prst="rect">
-            <a:avLst/>
-          </a:prstGeom>
-          <a:noFill/>
-          <a:ln w="9525" cap="flat" cmpd="sng">
-            <a:solidFill>
-              <a:schemeClr val="dk2"/>
-            </a:solidFill>
-            <a:prstDash val="solid"/>
-            <a:round/>
-            <a:headEnd type="none" w="sm" len="sm"/>
-            <a:tailEnd type="none" w="sm" len="sm"/>
-          </a:ln>
-        </p:spPr>
-      </p:pic>
-      <p:sp>
-        <p:nvSpPr>
-          <p:cNvPr id="296" name="Google Shape;296;p42"/>
-          <p:cNvSpPr/>
-          <p:nvPr/>
-        </p:nvSpPr>
-        <p:spPr>
-          <a:xfrm>
-            <a:off x="1076400" y="1928600"/>
-            <a:ext cx="697500" cy="209100"/>
-          </a:xfrm>
-          <a:prstGeom prst="rect">
-            <a:avLst/>
-          </a:prstGeom>
-          <a:noFill/>
-          <a:ln w="28575" cap="flat" cmpd="sng">
-            <a:solidFill>
-              <a:srgbClr val="FF0000"/>
-            </a:solidFill>
-            <a:prstDash val="solid"/>
-            <a:round/>
-            <a:headEnd type="none" w="sm" len="sm"/>
-            <a:tailEnd type="none" w="sm" len="sm"/>
-          </a:ln>
-        </p:spPr>
-        <p:txBody>
-          <a:bodyPr spcFirstLastPara="1" wrap="square" lIns="91425" tIns="91425" rIns="91425" bIns="91425" anchor="ctr" anchorCtr="0">
-            <a:noAutofit/>
-          </a:bodyPr>
-          <a:lstStyle/>
-          <a:p>
-            <a:pPr marL="0" lvl="0" indent="0" algn="l" rtl="0">
-              <a:spcBef>
-                <a:spcPts val="0"/>
-              </a:spcBef>
-              <a:spcAft>
-                <a:spcPts val="0"/>
-              </a:spcAft>
-              <a:buNone/>
-            </a:pPr>
-            <a:endParaRPr/>
-          </a:p>
-        </p:txBody>
-      </p:sp>
-      <p:sp>
-        <p:nvSpPr>
-          <p:cNvPr id="297" name="Google Shape;297;p42"/>
-          <p:cNvSpPr/>
-          <p:nvPr/>
-        </p:nvSpPr>
-        <p:spPr>
-          <a:xfrm>
-            <a:off x="1076400" y="2467213"/>
-            <a:ext cx="805800" cy="209100"/>
-          </a:xfrm>
-          <a:prstGeom prst="rect">
-            <a:avLst/>
-          </a:prstGeom>
-          <a:noFill/>
-          <a:ln w="28575" cap="flat" cmpd="sng">
-            <a:solidFill>
-              <a:srgbClr val="FF0000"/>
-            </a:solidFill>
-            <a:prstDash val="solid"/>
-            <a:round/>
-            <a:headEnd type="none" w="sm" len="sm"/>
-            <a:tailEnd type="none" w="sm" len="sm"/>
-          </a:ln>
-        </p:spPr>
-        <p:txBody>
-          <a:bodyPr spcFirstLastPara="1" wrap="square" lIns="91425" tIns="91425" rIns="91425" bIns="91425" anchor="ctr" anchorCtr="0">
-            <a:noAutofit/>
-          </a:bodyPr>
-          <a:lstStyle/>
-          <a:p>
-            <a:pPr marL="0" lvl="0" indent="0" algn="l" rtl="0">
-              <a:spcBef>
-                <a:spcPts val="0"/>
-              </a:spcBef>
-              <a:spcAft>
-                <a:spcPts val="0"/>
-              </a:spcAft>
-              <a:buNone/>
-            </a:pPr>
-            <a:endParaRPr/>
-          </a:p>
-        </p:txBody>
-      </p:sp>
-      <p:pic>
-        <p:nvPicPr>
-          <p:cNvPr id="298" name="Google Shape;298;p42"/>
-          <p:cNvPicPr preferRelativeResize="0"/>
-          <p:nvPr/>
-        </p:nvPicPr>
-        <p:blipFill>
-          <a:blip r:embed="rId4">
-            <a:alphaModFix/>
-          </a:blip>
-          <a:stretch>
-            <a:fillRect/>
-          </a:stretch>
-        </p:blipFill>
-        <p:spPr>
-          <a:xfrm>
-            <a:off x="538236" y="4287600"/>
-            <a:ext cx="677100" cy="677100"/>
-          </a:xfrm>
-          <a:prstGeom prst="rect">
-            <a:avLst/>
-          </a:prstGeom>
-          <a:noFill/>
-          <a:ln>
-            <a:noFill/>
-          </a:ln>
-        </p:spPr>
-      </p:pic>
-      <p:sp>
-        <p:nvSpPr>
-          <p:cNvPr id="299" name="Google Shape;299;p42"/>
-          <p:cNvSpPr txBox="1"/>
-          <p:nvPr/>
-        </p:nvSpPr>
-        <p:spPr>
-          <a:xfrm>
-            <a:off x="1215325" y="4318350"/>
-            <a:ext cx="5457300" cy="615600"/>
-          </a:xfrm>
-          <a:prstGeom prst="rect">
-            <a:avLst/>
-          </a:prstGeom>
-          <a:noFill/>
-          <a:ln>
-            <a:noFill/>
-          </a:ln>
-        </p:spPr>
-        <p:txBody>
-          <a:bodyPr spcFirstLastPara="1" wrap="square" lIns="91425" tIns="91425" rIns="91425" bIns="91425" anchor="t" anchorCtr="0">
-            <a:spAutoFit/>
-          </a:bodyPr>
-          <a:lstStyle/>
-          <a:p>
-            <a:pPr marL="0" lvl="0" indent="0" algn="l" rtl="0">
-              <a:spcBef>
-                <a:spcPts val="0"/>
-              </a:spcBef>
-              <a:spcAft>
-                <a:spcPts val="0"/>
-              </a:spcAft>
-              <a:buNone/>
-            </a:pPr>
-            <a:r>
-              <a:rPr lang="en-GB">
-                <a:latin typeface="Roboto"/>
-                <a:ea typeface="Roboto"/>
-                <a:cs typeface="Roboto"/>
-                <a:sym typeface="Roboto"/>
-              </a:rPr>
-              <a:t>Metadata is data about other data. For example, if we call a song our data, the metadata would be the author and song title.</a:t>
-            </a:r>
-            <a:endParaRPr>
-              <a:latin typeface="Roboto"/>
-              <a:ea typeface="Roboto"/>
-              <a:cs typeface="Roboto"/>
-              <a:sym typeface="Roboto"/>
-            </a:endParaRPr>
           </a:p>
         </p:txBody>
       </p:sp>

</xml_diff>